<commit_message>
Remove large data files and ignore data dirs
</commit_message>
<xml_diff>
--- a/assignment1/report-template-a1-with-GD.pptx
+++ b/assignment1/report-template-a1-with-GD.pptx
@@ -5,7 +5,7 @@
     <p:sldMasterId id="2147483648" r:id="rId1"/>
   </p:sldMasterIdLst>
   <p:notesMasterIdLst>
-    <p:notesMasterId r:id="rId19"/>
+    <p:notesMasterId r:id="rId20"/>
   </p:notesMasterIdLst>
   <p:sldIdLst>
     <p:sldId id="256" r:id="rId2"/>
@@ -23,8 +23,9 @@
     <p:sldId id="260" r:id="rId14"/>
     <p:sldId id="261" r:id="rId15"/>
     <p:sldId id="262" r:id="rId16"/>
-    <p:sldId id="263" r:id="rId17"/>
-    <p:sldId id="264" r:id="rId18"/>
+    <p:sldId id="273" r:id="rId17"/>
+    <p:sldId id="263" r:id="rId18"/>
+    <p:sldId id="264" r:id="rId19"/>
   </p:sldIdLst>
   <p:sldSz cx="9144000" cy="5143500" type="screen16x9"/>
   <p:notesSz cx="6858000" cy="9144000"/>
@@ -1973,7 +1974,7 @@
           </a:ln>
           <a:extLst>
             <a:ext uri="{C572A759-6A51-4108-AA02-DFA0A04FC94B}">
-              <ma14:wrappingTextBoxFlag xmlns:ma14="http://schemas.microsoft.com/office/mac/drawingml/2011/main" xmlns:a14="http://schemas.microsoft.com/office/drawing/2010/main" xmlns:m="http://schemas.openxmlformats.org/officeDocument/2006/math" xmlns="" val="1"/>
+              <ma14:wrappingTextBoxFlag xmlns="" xmlns:m="http://schemas.openxmlformats.org/officeDocument/2006/math" xmlns:a14="http://schemas.microsoft.com/office/drawing/2010/main" xmlns:ma14="http://schemas.microsoft.com/office/mac/drawingml/2011/main" val="1"/>
             </a:ext>
           </a:extLst>
         </p:spPr>
@@ -2012,7 +2013,7 @@
           </a:ln>
           <a:extLst>
             <a:ext uri="{C572A759-6A51-4108-AA02-DFA0A04FC94B}">
-              <ma14:wrappingTextBoxFlag xmlns:ma14="http://schemas.microsoft.com/office/mac/drawingml/2011/main" xmlns:a14="http://schemas.microsoft.com/office/drawing/2010/main" xmlns:m="http://schemas.openxmlformats.org/officeDocument/2006/math" xmlns="" val="1"/>
+              <ma14:wrappingTextBoxFlag xmlns="" xmlns:m="http://schemas.openxmlformats.org/officeDocument/2006/math" xmlns:a14="http://schemas.microsoft.com/office/drawing/2010/main" xmlns:ma14="http://schemas.microsoft.com/office/mac/drawingml/2011/main" val="1"/>
             </a:ext>
           </a:extLst>
         </p:spPr>
@@ -3039,7 +3040,7 @@
           </a:ln>
           <a:extLst>
             <a:ext uri="{C572A759-6A51-4108-AA02-DFA0A04FC94B}">
-              <ma14:wrappingTextBoxFlag xmlns:ma14="http://schemas.microsoft.com/office/mac/drawingml/2011/main" xmlns:a14="http://schemas.microsoft.com/office/drawing/2010/main" xmlns:m="http://schemas.openxmlformats.org/officeDocument/2006/math" xmlns="" val="1"/>
+              <ma14:wrappingTextBoxFlag xmlns="" xmlns:m="http://schemas.openxmlformats.org/officeDocument/2006/math" xmlns:a14="http://schemas.microsoft.com/office/drawing/2010/main" xmlns:ma14="http://schemas.microsoft.com/office/mac/drawingml/2011/main" val="1"/>
             </a:ext>
           </a:extLst>
         </p:spPr>
@@ -3186,7 +3187,7 @@
           <p:nvPr>
             <p:extLst>
               <p:ext uri="{D42A27DB-BD31-4B8C-83A1-F6EECF244321}">
-                <p14:modId xmlns:p14="http://schemas.microsoft.com/office/powerpoint/2010/main" val="1733423322"/>
+                <p14:modId xmlns:p14="http://schemas.microsoft.com/office/powerpoint/2010/main" val="2039967201"/>
               </p:ext>
             </p:extLst>
           </p:nvPr>
@@ -3371,7 +3372,11 @@
                       <a:pPr algn="l">
                         <a:defRPr sz="1400"/>
                       </a:pPr>
-                      <a:endParaRPr/>
+                      <a:r>
+                        <a:rPr lang="en-US" dirty="0"/>
+                        <a:t> 0.9214</a:t>
+                      </a:r>
+                      <a:endParaRPr dirty="0"/>
                     </a:p>
                   </a:txBody>
                   <a:tcPr marL="91425" marR="91425" marT="91425" marB="91425" horzOverflow="overflow"/>
@@ -3384,7 +3389,11 @@
                       <a:pPr algn="l">
                         <a:defRPr sz="1400"/>
                       </a:pPr>
-                      <a:endParaRPr/>
+                      <a:r>
+                        <a:rPr lang="en-US" dirty="0"/>
+                        <a:t> 0.9212</a:t>
+                      </a:r>
+                      <a:endParaRPr dirty="0"/>
                     </a:p>
                   </a:txBody>
                   <a:tcPr marL="91425" marR="91425" marT="91425" marB="91425" horzOverflow="overflow"/>
@@ -3397,7 +3406,11 @@
                       <a:pPr algn="l">
                         <a:defRPr sz="1400"/>
                       </a:pPr>
-                      <a:endParaRPr/>
+                      <a:r>
+                        <a:rPr lang="en-US" dirty="0"/>
+                        <a:t>0.9087</a:t>
+                      </a:r>
+                      <a:endParaRPr dirty="0"/>
                     </a:p>
                   </a:txBody>
                   <a:tcPr marL="91425" marR="91425" marT="91425" marB="91425" horzOverflow="overflow"/>
@@ -3410,7 +3423,11 @@
                       <a:pPr algn="l">
                         <a:defRPr sz="1400"/>
                       </a:pPr>
-                      <a:endParaRPr/>
+                      <a:r>
+                        <a:rPr lang="en-US" dirty="0"/>
+                        <a:t> 0.7307</a:t>
+                      </a:r>
+                      <a:endParaRPr dirty="0"/>
                     </a:p>
                   </a:txBody>
                   <a:tcPr marL="91425" marR="91425" marT="91425" marB="91425" horzOverflow="overflow"/>
@@ -3446,7 +3463,11 @@
                       <a:pPr algn="l">
                         <a:defRPr sz="1400"/>
                       </a:pPr>
-                      <a:endParaRPr/>
+                      <a:r>
+                        <a:rPr lang="en-US" dirty="0"/>
+                        <a:t>0.9265</a:t>
+                      </a:r>
+                      <a:endParaRPr dirty="0"/>
                     </a:p>
                   </a:txBody>
                   <a:tcPr marL="91425" marR="91425" marT="91425" marB="91425" horzOverflow="overflow"/>
@@ -3459,7 +3480,11 @@
                       <a:pPr algn="l">
                         <a:defRPr sz="1400"/>
                       </a:pPr>
-                      <a:endParaRPr/>
+                      <a:r>
+                        <a:rPr lang="en-US" dirty="0"/>
+                        <a:t>0.9264</a:t>
+                      </a:r>
+                      <a:endParaRPr dirty="0"/>
                     </a:p>
                   </a:txBody>
                   <a:tcPr marL="91425" marR="91425" marT="91425" marB="91425" horzOverflow="overflow"/>
@@ -3472,7 +3497,11 @@
                       <a:pPr algn="l">
                         <a:defRPr sz="1400"/>
                       </a:pPr>
-                      <a:endParaRPr/>
+                      <a:r>
+                        <a:rPr lang="en-US" dirty="0"/>
+                        <a:t> 0.9132</a:t>
+                      </a:r>
+                      <a:endParaRPr dirty="0"/>
                     </a:p>
                   </a:txBody>
                   <a:tcPr marL="91425" marR="91425" marT="91425" marB="91425" horzOverflow="overflow"/>
@@ -3485,6 +3514,10 @@
                       <a:pPr algn="l">
                         <a:defRPr sz="1400"/>
                       </a:pPr>
+                      <a:r>
+                        <a:rPr lang="en-US" dirty="0"/>
+                        <a:t> 0.7580</a:t>
+                      </a:r>
                       <a:endParaRPr dirty="0"/>
                     </a:p>
                   </a:txBody>
@@ -3889,7 +3922,7 @@
           <p:nvPr>
             <p:extLst>
               <p:ext uri="{D42A27DB-BD31-4B8C-83A1-F6EECF244321}">
-                <p14:modId xmlns:p14="http://schemas.microsoft.com/office/powerpoint/2010/main" val="520544730"/>
+                <p14:modId xmlns:p14="http://schemas.microsoft.com/office/powerpoint/2010/main" val="3524451577"/>
               </p:ext>
             </p:extLst>
           </p:nvPr>
@@ -3919,14 +3952,14 @@
                     </a:ext>
                   </a:extLst>
                 </a:gridCol>
-                <a:gridCol w="1257093">
+                <a:gridCol w="1240118">
                   <a:extLst>
                     <a:ext uri="{9D8B030D-6E8A-4147-A177-3AD203B41FA5}">
                       <a16:colId xmlns:a16="http://schemas.microsoft.com/office/drawing/2014/main" val="3812410909"/>
                     </a:ext>
                   </a:extLst>
                 </a:gridCol>
-                <a:gridCol w="1257093">
+                <a:gridCol w="1274068">
                   <a:extLst>
                     <a:ext uri="{9D8B030D-6E8A-4147-A177-3AD203B41FA5}">
                       <a16:colId xmlns:a16="http://schemas.microsoft.com/office/drawing/2014/main" val="20002"/>
@@ -4113,6 +4146,10 @@
                       <a:pPr algn="l">
                         <a:defRPr sz="1400"/>
                       </a:pPr>
+                      <a:r>
+                        <a:rPr lang="en-US" dirty="0"/>
+                        <a:t>0.1059</a:t>
+                      </a:r>
                       <a:endParaRPr dirty="0"/>
                     </a:p>
                   </a:txBody>
@@ -4126,6 +4163,10 @@
                       <a:pPr algn="l">
                         <a:defRPr sz="1400"/>
                       </a:pPr>
+                      <a:r>
+                        <a:rPr lang="en-US" dirty="0"/>
+                        <a:t>0.1036</a:t>
+                      </a:r>
                       <a:endParaRPr dirty="0"/>
                     </a:p>
                   </a:txBody>
@@ -4139,6 +4180,10 @@
                       <a:pPr algn="l">
                         <a:defRPr sz="1400"/>
                       </a:pPr>
+                      <a:r>
+                        <a:rPr lang="en-US" dirty="0"/>
+                        <a:t> 0.8431</a:t>
+                      </a:r>
                       <a:endParaRPr dirty="0"/>
                     </a:p>
                   </a:txBody>
@@ -4152,6 +4197,10 @@
                       <a:pPr algn="l">
                         <a:defRPr sz="1400"/>
                       </a:pPr>
+                      <a:r>
+                        <a:rPr lang="en-US" dirty="0"/>
+                        <a:t>0.9430</a:t>
+                      </a:r>
                       <a:endParaRPr dirty="0"/>
                     </a:p>
                   </a:txBody>
@@ -4165,7 +4214,11 @@
                       <a:pPr algn="l">
                         <a:defRPr sz="1400"/>
                       </a:pPr>
-                      <a:endParaRPr/>
+                      <a:r>
+                        <a:rPr lang="en-US" dirty="0"/>
+                        <a:t>0.9801</a:t>
+                      </a:r>
+                      <a:endParaRPr dirty="0"/>
                     </a:p>
                   </a:txBody>
                   <a:tcPr marL="91425" marR="91425" marT="91425" marB="91425" horzOverflow="overflow"/>
@@ -4201,6 +4254,10 @@
                       <a:pPr algn="l">
                         <a:defRPr sz="1400"/>
                       </a:pPr>
+                      <a:r>
+                        <a:rPr lang="en-US" dirty="0"/>
+                        <a:t>0.1081</a:t>
+                      </a:r>
                       <a:endParaRPr dirty="0"/>
                     </a:p>
                   </a:txBody>
@@ -4214,6 +4271,10 @@
                       <a:pPr algn="l">
                         <a:defRPr sz="1400"/>
                       </a:pPr>
+                      <a:r>
+                        <a:rPr lang="en-US" dirty="0"/>
+                        <a:t> 0.1060</a:t>
+                      </a:r>
                       <a:endParaRPr dirty="0"/>
                     </a:p>
                   </a:txBody>
@@ -4227,19 +4288,10 @@
                       <a:pPr algn="l">
                         <a:defRPr sz="1400"/>
                       </a:pPr>
-                      <a:endParaRPr/>
-                    </a:p>
-                  </a:txBody>
-                  <a:tcPr marL="91425" marR="91425" marT="91425" marB="91425" horzOverflow="overflow"/>
-                </a:tc>
-                <a:tc>
-                  <a:txBody>
-                    <a:bodyPr/>
-                    <a:lstStyle/>
-                    <a:p>
-                      <a:pPr algn="l">
-                        <a:defRPr sz="1400"/>
-                      </a:pPr>
+                      <a:r>
+                        <a:rPr lang="en-US" dirty="0"/>
+                        <a:t> 0.8798</a:t>
+                      </a:r>
                       <a:endParaRPr dirty="0"/>
                     </a:p>
                   </a:txBody>
@@ -4253,6 +4305,27 @@
                       <a:pPr algn="l">
                         <a:defRPr sz="1400"/>
                       </a:pPr>
+                      <a:r>
+                        <a:rPr lang="en-US" dirty="0"/>
+                        <a:t> 0.9490</a:t>
+                      </a:r>
+                      <a:endParaRPr dirty="0"/>
+                    </a:p>
+                  </a:txBody>
+                  <a:tcPr marL="91425" marR="91425" marT="91425" marB="91425" horzOverflow="overflow"/>
+                </a:tc>
+                <a:tc>
+                  <a:txBody>
+                    <a:bodyPr/>
+                    <a:lstStyle/>
+                    <a:p>
+                      <a:pPr algn="l">
+                        <a:defRPr sz="1400"/>
+                      </a:pPr>
+                      <a:r>
+                        <a:rPr lang="en-US" dirty="0"/>
+                        <a:t>0.9730</a:t>
+                      </a:r>
                       <a:endParaRPr dirty="0"/>
                     </a:p>
                   </a:txBody>
@@ -4289,6 +4362,10 @@
                       <a:pPr algn="l">
                         <a:defRPr sz="1400"/>
                       </a:pPr>
+                      <a:r>
+                        <a:rPr lang="en-US" dirty="0"/>
+                        <a:t>0.1028</a:t>
+                      </a:r>
                       <a:endParaRPr dirty="0"/>
                     </a:p>
                   </a:txBody>
@@ -4302,6 +4379,10 @@
                       <a:pPr algn="l">
                         <a:defRPr sz="1400"/>
                       </a:pPr>
+                      <a:r>
+                        <a:rPr lang="en-US" dirty="0"/>
+                        <a:t>0.1994</a:t>
+                      </a:r>
                       <a:endParaRPr dirty="0"/>
                     </a:p>
                   </a:txBody>
@@ -4315,6 +4396,10 @@
                       <a:pPr algn="l">
                         <a:defRPr sz="1400"/>
                       </a:pPr>
+                      <a:r>
+                        <a:rPr lang="en-US" dirty="0"/>
+                        <a:t>0.8849</a:t>
+                      </a:r>
                       <a:endParaRPr dirty="0"/>
                     </a:p>
                   </a:txBody>
@@ -4328,6 +4413,10 @@
                       <a:pPr algn="l">
                         <a:defRPr sz="1400"/>
                       </a:pPr>
+                      <a:r>
+                        <a:rPr lang="en-US" dirty="0"/>
+                        <a:t> 0.9476</a:t>
+                      </a:r>
                       <a:endParaRPr dirty="0"/>
                     </a:p>
                   </a:txBody>
@@ -4341,6 +4430,10 @@
                       <a:pPr algn="l">
                         <a:defRPr sz="1400"/>
                       </a:pPr>
+                      <a:r>
+                        <a:rPr lang="en-US" dirty="0"/>
+                        <a:t> 0.9733</a:t>
+                      </a:r>
                       <a:endParaRPr dirty="0"/>
                     </a:p>
                   </a:txBody>
@@ -4501,6 +4594,92 @@
       </p:grpSpPr>
       <p:sp>
         <p:nvSpPr>
+          <p:cNvPr id="2" name="Title 1">
+            <a:extLst>
+              <a:ext uri="{FF2B5EF4-FFF2-40B4-BE49-F238E27FC236}">
+                <a16:creationId xmlns:a16="http://schemas.microsoft.com/office/drawing/2014/main" id="{576FD232-F850-0D48-9E7B-D9800A258EAB}"/>
+              </a:ext>
+            </a:extLst>
+          </p:cNvPr>
+          <p:cNvSpPr>
+            <a:spLocks noGrp="1"/>
+          </p:cNvSpPr>
+          <p:nvPr>
+            <p:ph type="title"/>
+          </p:nvPr>
+        </p:nvSpPr>
+        <p:spPr/>
+        <p:txBody>
+          <a:bodyPr>
+            <a:normAutofit fontScale="90000"/>
+          </a:bodyPr>
+          <a:lstStyle/>
+          <a:p>
+            <a:endParaRPr lang="en-US"/>
+          </a:p>
+        </p:txBody>
+      </p:sp>
+      <p:sp>
+        <p:nvSpPr>
+          <p:cNvPr id="3" name="Text Placeholder 2">
+            <a:extLst>
+              <a:ext uri="{FF2B5EF4-FFF2-40B4-BE49-F238E27FC236}">
+                <a16:creationId xmlns:a16="http://schemas.microsoft.com/office/drawing/2014/main" id="{07FE5FB8-0386-C535-CFC5-E74CFB9224DC}"/>
+              </a:ext>
+            </a:extLst>
+          </p:cNvPr>
+          <p:cNvSpPr>
+            <a:spLocks noGrp="1"/>
+          </p:cNvSpPr>
+          <p:nvPr>
+            <p:ph type="body" idx="1"/>
+          </p:nvPr>
+        </p:nvSpPr>
+        <p:spPr/>
+        <p:txBody>
+          <a:bodyPr/>
+          <a:lstStyle/>
+          <a:p>
+            <a:r>
+              <a:rPr lang="en-US" dirty="0"/>
+              <a:t>Final Accuracy on Test Data: 0.9736</a:t>
+            </a:r>
+          </a:p>
+        </p:txBody>
+      </p:sp>
+    </p:spTree>
+    <p:extLst>
+      <p:ext uri="{BB962C8B-B14F-4D97-AF65-F5344CB8AC3E}">
+        <p14:creationId xmlns:p14="http://schemas.microsoft.com/office/powerpoint/2010/main" val="1667868953"/>
+      </p:ext>
+    </p:extLst>
+  </p:cSld>
+  <p:clrMapOvr>
+    <a:masterClrMapping/>
+  </p:clrMapOvr>
+  <p:transition spd="med"/>
+</p:sld>
+</file>
+
+<file path=ppt/slides/slide17.xml><?xml version="1.0" encoding="utf-8"?>
+<p:sld xmlns:a="http://schemas.openxmlformats.org/drawingml/2006/main" xmlns:r="http://schemas.openxmlformats.org/officeDocument/2006/relationships" xmlns:p="http://schemas.openxmlformats.org/presentationml/2006/main">
+  <p:cSld>
+    <p:spTree>
+      <p:nvGrpSpPr>
+        <p:cNvPr id="1" name=""/>
+        <p:cNvGrpSpPr/>
+        <p:nvPr/>
+      </p:nvGrpSpPr>
+      <p:grpSpPr>
+        <a:xfrm>
+          <a:off x="0" y="0"/>
+          <a:ext cx="0" cy="0"/>
+          <a:chOff x="0" y="0"/>
+          <a:chExt cx="0" cy="0"/>
+        </a:xfrm>
+      </p:grpSpPr>
+      <p:sp>
+        <p:nvSpPr>
           <p:cNvPr id="131" name="Google Shape;97;p20"/>
           <p:cNvSpPr txBox="1">
             <a:spLocks noGrp="1"/>
@@ -4633,7 +4812,7 @@
 </p:sld>
 </file>
 
-<file path=ppt/slides/slide17.xml><?xml version="1.0" encoding="utf-8"?>
+<file path=ppt/slides/slide18.xml><?xml version="1.0" encoding="utf-8"?>
 <p:sld xmlns:a="http://schemas.openxmlformats.org/drawingml/2006/main" xmlns:r="http://schemas.openxmlformats.org/officeDocument/2006/relationships" xmlns:p="http://schemas.openxmlformats.org/presentationml/2006/main">
   <p:cSld>
     <p:spTree>

</xml_diff>